<commit_message>
trimmed phase one presentation
</commit_message>
<xml_diff>
--- a/PresentationPhase1.pptx
+++ b/PresentationPhase1.pptx
@@ -5,7 +5,7 @@
     <p:sldMasterId id="2147483660" r:id="rId1"/>
   </p:sldMasterIdLst>
   <p:notesMasterIdLst>
-    <p:notesMasterId r:id="rId22"/>
+    <p:notesMasterId r:id="rId15"/>
   </p:notesMasterIdLst>
   <p:sldIdLst>
     <p:sldId id="256" r:id="rId2"/>
@@ -21,13 +21,6 @@
     <p:sldId id="269" r:id="rId12"/>
     <p:sldId id="271" r:id="rId13"/>
     <p:sldId id="272" r:id="rId14"/>
-    <p:sldId id="264" r:id="rId15"/>
-    <p:sldId id="258" r:id="rId16"/>
-    <p:sldId id="260" r:id="rId17"/>
-    <p:sldId id="259" r:id="rId18"/>
-    <p:sldId id="261" r:id="rId19"/>
-    <p:sldId id="262" r:id="rId20"/>
-    <p:sldId id="275" r:id="rId21"/>
   </p:sldIdLst>
   <p:sldSz cx="9144000" cy="6858000" type="screen4x3"/>
   <p:notesSz cx="6858000" cy="9144000"/>
@@ -7655,1584 +7648,6 @@
 </p:sld>
 </file>
 
-<file path=ppt/slides/slide14.xml><?xml version="1.0" encoding="utf-8"?>
-<p:sld xmlns:a="http://schemas.openxmlformats.org/drawingml/2006/main" xmlns:r="http://schemas.openxmlformats.org/officeDocument/2006/relationships" xmlns:p="http://schemas.openxmlformats.org/presentationml/2006/main">
-  <p:cSld>
-    <p:spTree>
-      <p:nvGrpSpPr>
-        <p:cNvPr id="1" name=""/>
-        <p:cNvGrpSpPr/>
-        <p:nvPr/>
-      </p:nvGrpSpPr>
-      <p:grpSpPr>
-        <a:xfrm>
-          <a:off x="0" y="0"/>
-          <a:ext cx="0" cy="0"/>
-          <a:chOff x="0" y="0"/>
-          <a:chExt cx="0" cy="0"/>
-        </a:xfrm>
-      </p:grpSpPr>
-      <p:sp>
-        <p:nvSpPr>
-          <p:cNvPr id="2" name="Title 1"/>
-          <p:cNvSpPr>
-            <a:spLocks noGrp="1"/>
-          </p:cNvSpPr>
-          <p:nvPr>
-            <p:ph type="title"/>
-          </p:nvPr>
-        </p:nvSpPr>
-        <p:spPr/>
-        <p:txBody>
-          <a:bodyPr/>
-          <a:lstStyle/>
-          <a:p>
-            <a:r>
-              <a:rPr lang="en-GB" dirty="0"/>
-              <a:t>2</a:t>
-            </a:r>
-            <a:r>
-              <a:rPr lang="en-GB" dirty="0" smtClean="0"/>
-              <a:t>. Phase 2</a:t>
-            </a:r>
-            <a:endParaRPr lang="en-GB" dirty="0"/>
-          </a:p>
-        </p:txBody>
-      </p:sp>
-      <p:sp>
-        <p:nvSpPr>
-          <p:cNvPr id="3" name="Text Placeholder 2"/>
-          <p:cNvSpPr>
-            <a:spLocks noGrp="1"/>
-          </p:cNvSpPr>
-          <p:nvPr>
-            <p:ph type="body" idx="1"/>
-          </p:nvPr>
-        </p:nvSpPr>
-        <p:spPr/>
-        <p:txBody>
-          <a:bodyPr/>
-          <a:lstStyle/>
-          <a:p>
-            <a:r>
-              <a:rPr lang="en-GB" dirty="0" smtClean="0"/>
-              <a:t>Human Immune Response Modelling</a:t>
-            </a:r>
-            <a:endParaRPr lang="en-GB" dirty="0"/>
-          </a:p>
-        </p:txBody>
-      </p:sp>
-      <p:sp>
-        <p:nvSpPr>
-          <p:cNvPr id="4" name="Slide Number Placeholder 3"/>
-          <p:cNvSpPr>
-            <a:spLocks noGrp="1"/>
-          </p:cNvSpPr>
-          <p:nvPr>
-            <p:ph type="sldNum" sz="quarter" idx="12"/>
-          </p:nvPr>
-        </p:nvSpPr>
-        <p:spPr/>
-        <p:txBody>
-          <a:bodyPr/>
-          <a:lstStyle/>
-          <a:p>
-            <a:fld id="{51D7D327-A714-4223-84C1-7E652E779977}" type="slidenum">
-              <a:rPr lang="en-GB" smtClean="0"/>
-              <a:t>14</a:t>
-            </a:fld>
-            <a:endParaRPr lang="en-GB"/>
-          </a:p>
-        </p:txBody>
-      </p:sp>
-    </p:spTree>
-    <p:extLst>
-      <p:ext uri="{BB962C8B-B14F-4D97-AF65-F5344CB8AC3E}">
-        <p14:creationId xmlns:p14="http://schemas.microsoft.com/office/powerpoint/2010/main" val="971625021"/>
-      </p:ext>
-    </p:extLst>
-  </p:cSld>
-  <p:clrMapOvr>
-    <a:masterClrMapping/>
-  </p:clrMapOvr>
-  <p:timing>
-    <p:tnLst>
-      <p:par>
-        <p:cTn id="1" dur="indefinite" restart="never" nodeType="tmRoot"/>
-      </p:par>
-    </p:tnLst>
-  </p:timing>
-</p:sld>
-</file>
-
-<file path=ppt/slides/slide15.xml><?xml version="1.0" encoding="utf-8"?>
-<p:sld xmlns:a="http://schemas.openxmlformats.org/drawingml/2006/main" xmlns:r="http://schemas.openxmlformats.org/officeDocument/2006/relationships" xmlns:p="http://schemas.openxmlformats.org/presentationml/2006/main">
-  <p:cSld>
-    <p:spTree>
-      <p:nvGrpSpPr>
-        <p:cNvPr id="1" name=""/>
-        <p:cNvGrpSpPr/>
-        <p:nvPr/>
-      </p:nvGrpSpPr>
-      <p:grpSpPr>
-        <a:xfrm>
-          <a:off x="0" y="0"/>
-          <a:ext cx="0" cy="0"/>
-          <a:chOff x="0" y="0"/>
-          <a:chExt cx="0" cy="0"/>
-        </a:xfrm>
-      </p:grpSpPr>
-      <p:sp>
-        <p:nvSpPr>
-          <p:cNvPr id="2" name="Content Placeholder 1"/>
-          <p:cNvSpPr>
-            <a:spLocks noGrp="1"/>
-          </p:cNvSpPr>
-          <p:nvPr>
-            <p:ph idx="1"/>
-          </p:nvPr>
-        </p:nvSpPr>
-        <p:spPr/>
-        <p:txBody>
-          <a:bodyPr/>
-          <a:lstStyle/>
-          <a:p>
-            <a:pPr marL="109728" indent="0">
-              <a:buNone/>
-            </a:pPr>
-            <a:endParaRPr lang="en-GB" dirty="0" smtClean="0"/>
-          </a:p>
-          <a:p>
-            <a:r>
-              <a:rPr lang="en-GB" dirty="0" smtClean="0"/>
-              <a:t>The human immune system is a complicated entity</a:t>
-            </a:r>
-          </a:p>
-          <a:p>
-            <a:r>
-              <a:rPr lang="en-GB" dirty="0" smtClean="0"/>
-              <a:t>The model of </a:t>
-            </a:r>
-            <a:r>
-              <a:rPr lang="en-GB" dirty="0" err="1" smtClean="0"/>
-              <a:t>Hancioglu</a:t>
-            </a:r>
-            <a:r>
-              <a:rPr lang="en-GB" dirty="0" smtClean="0"/>
-              <a:t> </a:t>
-            </a:r>
-            <a:r>
-              <a:rPr lang="en-GB" i="1" dirty="0" smtClean="0"/>
-              <a:t>et al. </a:t>
-            </a:r>
-            <a:r>
-              <a:rPr lang="en-GB" dirty="0" smtClean="0"/>
-              <a:t>(2007) seeks to capture some of its behaviour…</a:t>
-            </a:r>
-          </a:p>
-          <a:p>
-            <a:r>
-              <a:rPr lang="en-GB" dirty="0" smtClean="0"/>
-              <a:t>… specifically the interplay between innate and adaptive immunity</a:t>
-            </a:r>
-          </a:p>
-          <a:p>
-            <a:r>
-              <a:rPr lang="en-GB" dirty="0" smtClean="0"/>
-              <a:t>Group G (Pearce </a:t>
-            </a:r>
-            <a:r>
-              <a:rPr lang="en-GB" i="1" dirty="0" smtClean="0"/>
-              <a:t>et al.</a:t>
-            </a:r>
-            <a:r>
-              <a:rPr lang="en-GB" dirty="0" smtClean="0"/>
-              <a:t>) were tasked with implementing model in </a:t>
-            </a:r>
-            <a:r>
-              <a:rPr lang="en-GB" dirty="0" err="1" smtClean="0"/>
-              <a:t>MatLab</a:t>
-            </a:r>
-            <a:r>
-              <a:rPr lang="en-GB" dirty="0" smtClean="0"/>
-              <a:t>®</a:t>
-            </a:r>
-          </a:p>
-          <a:p>
-            <a:pPr marL="109728" indent="0">
-              <a:buNone/>
-            </a:pPr>
-            <a:endParaRPr lang="en-GB" dirty="0" smtClean="0"/>
-          </a:p>
-        </p:txBody>
-      </p:sp>
-      <p:sp>
-        <p:nvSpPr>
-          <p:cNvPr id="3" name="Title 2"/>
-          <p:cNvSpPr>
-            <a:spLocks noGrp="1"/>
-          </p:cNvSpPr>
-          <p:nvPr>
-            <p:ph type="title"/>
-          </p:nvPr>
-        </p:nvSpPr>
-        <p:spPr/>
-        <p:txBody>
-          <a:bodyPr>
-            <a:normAutofit fontScale="90000"/>
-          </a:bodyPr>
-          <a:lstStyle/>
-          <a:p>
-            <a:r>
-              <a:rPr lang="en-GB" dirty="0" smtClean="0"/>
-              <a:t>The Problem – </a:t>
-            </a:r>
-            <a:r>
-              <a:rPr lang="en-GB" b="0" dirty="0" smtClean="0"/>
-              <a:t>Human Immune Response Modelling</a:t>
-            </a:r>
-            <a:endParaRPr lang="en-GB" b="0" dirty="0"/>
-          </a:p>
-        </p:txBody>
-      </p:sp>
-      <p:sp>
-        <p:nvSpPr>
-          <p:cNvPr id="4" name="Slide Number Placeholder 3"/>
-          <p:cNvSpPr>
-            <a:spLocks noGrp="1"/>
-          </p:cNvSpPr>
-          <p:nvPr>
-            <p:ph type="sldNum" sz="quarter" idx="4"/>
-          </p:nvPr>
-        </p:nvSpPr>
-        <p:spPr/>
-        <p:txBody>
-          <a:bodyPr/>
-          <a:lstStyle/>
-          <a:p>
-            <a:fld id="{57E314E1-448B-4E82-884A-39F65482640B}" type="slidenum">
-              <a:rPr lang="en-GB" smtClean="0"/>
-              <a:t>15</a:t>
-            </a:fld>
-            <a:endParaRPr lang="en-GB" dirty="0"/>
-          </a:p>
-        </p:txBody>
-      </p:sp>
-    </p:spTree>
-    <p:extLst>
-      <p:ext uri="{BB962C8B-B14F-4D97-AF65-F5344CB8AC3E}">
-        <p14:creationId xmlns:p14="http://schemas.microsoft.com/office/powerpoint/2010/main" val="33268773"/>
-      </p:ext>
-    </p:extLst>
-  </p:cSld>
-  <p:clrMapOvr>
-    <a:masterClrMapping/>
-  </p:clrMapOvr>
-</p:sld>
-</file>
-
-<file path=ppt/slides/slide16.xml><?xml version="1.0" encoding="utf-8"?>
-<p:sld xmlns:a="http://schemas.openxmlformats.org/drawingml/2006/main" xmlns:r="http://schemas.openxmlformats.org/officeDocument/2006/relationships" xmlns:p="http://schemas.openxmlformats.org/presentationml/2006/main">
-  <p:cSld>
-    <p:spTree>
-      <p:nvGrpSpPr>
-        <p:cNvPr id="1" name=""/>
-        <p:cNvGrpSpPr/>
-        <p:nvPr/>
-      </p:nvGrpSpPr>
-      <p:grpSpPr>
-        <a:xfrm>
-          <a:off x="0" y="0"/>
-          <a:ext cx="0" cy="0"/>
-          <a:chOff x="0" y="0"/>
-          <a:chExt cx="0" cy="0"/>
-        </a:xfrm>
-      </p:grpSpPr>
-      <p:sp>
-        <p:nvSpPr>
-          <p:cNvPr id="2" name="Content Placeholder 1"/>
-          <p:cNvSpPr>
-            <a:spLocks noGrp="1"/>
-          </p:cNvSpPr>
-          <p:nvPr>
-            <p:ph idx="1"/>
-          </p:nvPr>
-        </p:nvSpPr>
-        <p:spPr/>
-        <p:txBody>
-          <a:bodyPr/>
-          <a:lstStyle/>
-          <a:p>
-            <a:r>
-              <a:rPr lang="en-GB" dirty="0" smtClean="0"/>
-              <a:t>Jin, can you help out here?</a:t>
-            </a:r>
-          </a:p>
-          <a:p>
-            <a:r>
-              <a:rPr lang="en-GB" dirty="0" smtClean="0"/>
-              <a:t>Just want some quick introductory facts/pictures/diagrams</a:t>
-            </a:r>
-            <a:endParaRPr lang="en-GB" dirty="0"/>
-          </a:p>
-        </p:txBody>
-      </p:sp>
-      <p:sp>
-        <p:nvSpPr>
-          <p:cNvPr id="3" name="Title 2"/>
-          <p:cNvSpPr>
-            <a:spLocks noGrp="1"/>
-          </p:cNvSpPr>
-          <p:nvPr>
-            <p:ph type="title"/>
-          </p:nvPr>
-        </p:nvSpPr>
-        <p:spPr/>
-        <p:txBody>
-          <a:bodyPr/>
-          <a:lstStyle/>
-          <a:p>
-            <a:r>
-              <a:rPr lang="en-GB" dirty="0" smtClean="0"/>
-              <a:t>Biology of the immune system</a:t>
-            </a:r>
-            <a:endParaRPr lang="en-GB" dirty="0"/>
-          </a:p>
-        </p:txBody>
-      </p:sp>
-      <p:sp>
-        <p:nvSpPr>
-          <p:cNvPr id="4" name="Slide Number Placeholder 3"/>
-          <p:cNvSpPr>
-            <a:spLocks noGrp="1"/>
-          </p:cNvSpPr>
-          <p:nvPr>
-            <p:ph type="sldNum" sz="quarter" idx="4"/>
-          </p:nvPr>
-        </p:nvSpPr>
-        <p:spPr/>
-        <p:txBody>
-          <a:bodyPr/>
-          <a:lstStyle/>
-          <a:p>
-            <a:fld id="{57E314E1-448B-4E82-884A-39F65482640B}" type="slidenum">
-              <a:rPr lang="en-GB" smtClean="0"/>
-              <a:t>16</a:t>
-            </a:fld>
-            <a:endParaRPr lang="en-GB" dirty="0"/>
-          </a:p>
-        </p:txBody>
-      </p:sp>
-    </p:spTree>
-    <p:extLst>
-      <p:ext uri="{BB962C8B-B14F-4D97-AF65-F5344CB8AC3E}">
-        <p14:creationId xmlns:p14="http://schemas.microsoft.com/office/powerpoint/2010/main" val="112241208"/>
-      </p:ext>
-    </p:extLst>
-  </p:cSld>
-  <p:clrMapOvr>
-    <a:masterClrMapping/>
-  </p:clrMapOvr>
-</p:sld>
-</file>
-
-<file path=ppt/slides/slide17.xml><?xml version="1.0" encoding="utf-8"?>
-<p:sld xmlns:a="http://schemas.openxmlformats.org/drawingml/2006/main" xmlns:r="http://schemas.openxmlformats.org/officeDocument/2006/relationships" xmlns:p="http://schemas.openxmlformats.org/presentationml/2006/main">
-  <p:cSld>
-    <p:spTree>
-      <p:nvGrpSpPr>
-        <p:cNvPr id="1" name=""/>
-        <p:cNvGrpSpPr/>
-        <p:nvPr/>
-      </p:nvGrpSpPr>
-      <p:grpSpPr>
-        <a:xfrm>
-          <a:off x="0" y="0"/>
-          <a:ext cx="0" cy="0"/>
-          <a:chOff x="0" y="0"/>
-          <a:chExt cx="0" cy="0"/>
-        </a:xfrm>
-      </p:grpSpPr>
-      <p:sp>
-        <p:nvSpPr>
-          <p:cNvPr id="3" name="Title 2"/>
-          <p:cNvSpPr>
-            <a:spLocks noGrp="1"/>
-          </p:cNvSpPr>
-          <p:nvPr>
-            <p:ph type="title"/>
-          </p:nvPr>
-        </p:nvSpPr>
-        <p:spPr/>
-        <p:txBody>
-          <a:bodyPr/>
-          <a:lstStyle/>
-          <a:p>
-            <a:r>
-              <a:rPr lang="en-GB" dirty="0" smtClean="0"/>
-              <a:t>The </a:t>
-            </a:r>
-            <a:r>
-              <a:rPr lang="en-GB" dirty="0" err="1" smtClean="0"/>
-              <a:t>Hancioglu</a:t>
-            </a:r>
-            <a:r>
-              <a:rPr lang="en-GB" dirty="0" smtClean="0"/>
-              <a:t> model</a:t>
-            </a:r>
-            <a:endParaRPr lang="en-GB" dirty="0"/>
-          </a:p>
-        </p:txBody>
-      </p:sp>
-      <p:sp>
-        <p:nvSpPr>
-          <p:cNvPr id="4" name="Slide Number Placeholder 3"/>
-          <p:cNvSpPr>
-            <a:spLocks noGrp="1"/>
-          </p:cNvSpPr>
-          <p:nvPr>
-            <p:ph type="sldNum" sz="quarter" idx="4"/>
-          </p:nvPr>
-        </p:nvSpPr>
-        <p:spPr/>
-        <p:txBody>
-          <a:bodyPr/>
-          <a:lstStyle/>
-          <a:p>
-            <a:fld id="{57E314E1-448B-4E82-884A-39F65482640B}" type="slidenum">
-              <a:rPr lang="en-GB" smtClean="0"/>
-              <a:t>17</a:t>
-            </a:fld>
-            <a:endParaRPr lang="en-GB" dirty="0"/>
-          </a:p>
-        </p:txBody>
-      </p:sp>
-      <p:pic>
-        <p:nvPicPr>
-          <p:cNvPr id="9" name="Picture 3"/>
-          <p:cNvPicPr>
-            <a:picLocks noChangeAspect="1" noChangeArrowheads="1"/>
-          </p:cNvPicPr>
-          <p:nvPr/>
-        </p:nvPicPr>
-        <p:blipFill rotWithShape="1">
-          <a:blip r:embed="rId2" cstate="print">
-            <a:extLst>
-              <a:ext uri="{28A0092B-C50C-407E-A947-70E740481C1C}">
-                <a14:useLocalDpi xmlns:a14="http://schemas.microsoft.com/office/drawing/2010/main" val="0"/>
-              </a:ext>
-            </a:extLst>
-          </a:blip>
-          <a:srcRect l="26159" t="9591" r="12117" b="12267"/>
-          <a:stretch/>
-        </p:blipFill>
-        <p:spPr bwMode="auto">
-          <a:xfrm>
-            <a:off x="4208943" y="1700808"/>
-            <a:ext cx="4806669" cy="3422931"/>
-          </a:xfrm>
-          <a:prstGeom prst="rect">
-            <a:avLst/>
-          </a:prstGeom>
-          <a:noFill/>
-          <a:ln>
-            <a:noFill/>
-          </a:ln>
-          <a:effectLst/>
-          <a:extLst>
-            <a:ext uri="{909E8E84-426E-40DD-AFC4-6F175D3DCCD1}">
-              <a14:hiddenFill xmlns:a14="http://schemas.microsoft.com/office/drawing/2010/main">
-                <a:solidFill>
-                  <a:schemeClr val="accent1"/>
-                </a:solidFill>
-              </a14:hiddenFill>
-            </a:ext>
-            <a:ext uri="{91240B29-F687-4F45-9708-019B960494DF}">
-              <a14:hiddenLine xmlns:a14="http://schemas.microsoft.com/office/drawing/2010/main" w="9525">
-                <a:solidFill>
-                  <a:schemeClr val="tx1"/>
-                </a:solidFill>
-                <a:miter lim="800000"/>
-                <a:headEnd/>
-                <a:tailEnd/>
-              </a14:hiddenLine>
-            </a:ext>
-            <a:ext uri="{AF507438-7753-43E0-B8FC-AC1667EBCBE1}">
-              <a14:hiddenEffects xmlns:a14="http://schemas.microsoft.com/office/drawing/2010/main">
-                <a:effectLst>
-                  <a:outerShdw dist="35921" dir="2700000" algn="ctr" rotWithShape="0">
-                    <a:schemeClr val="bg2"/>
-                  </a:outerShdw>
-                </a:effectLst>
-              </a14:hiddenEffects>
-            </a:ext>
-          </a:extLst>
-        </p:spPr>
-      </p:pic>
-      <p:pic>
-        <p:nvPicPr>
-          <p:cNvPr id="1026" name="Picture 2"/>
-          <p:cNvPicPr>
-            <a:picLocks noChangeAspect="1" noChangeArrowheads="1"/>
-          </p:cNvPicPr>
-          <p:nvPr/>
-        </p:nvPicPr>
-        <p:blipFill>
-          <a:blip r:embed="rId3" cstate="print">
-            <a:extLst>
-              <a:ext uri="{28A0092B-C50C-407E-A947-70E740481C1C}">
-                <a14:useLocalDpi xmlns:a14="http://schemas.microsoft.com/office/drawing/2010/main" val="0"/>
-              </a:ext>
-            </a:extLst>
-          </a:blip>
-          <a:srcRect/>
-          <a:stretch>
-            <a:fillRect/>
-          </a:stretch>
-        </p:blipFill>
-        <p:spPr bwMode="auto">
-          <a:xfrm>
-            <a:off x="467544" y="1858712"/>
-            <a:ext cx="3918614" cy="2996951"/>
-          </a:xfrm>
-          <a:prstGeom prst="rect">
-            <a:avLst/>
-          </a:prstGeom>
-          <a:noFill/>
-          <a:ln>
-            <a:noFill/>
-          </a:ln>
-          <a:effectLst/>
-          <a:extLst>
-            <a:ext uri="{909E8E84-426E-40DD-AFC4-6F175D3DCCD1}">
-              <a14:hiddenFill xmlns:a14="http://schemas.microsoft.com/office/drawing/2010/main">
-                <a:solidFill>
-                  <a:schemeClr val="accent1"/>
-                </a:solidFill>
-              </a14:hiddenFill>
-            </a:ext>
-            <a:ext uri="{91240B29-F687-4F45-9708-019B960494DF}">
-              <a14:hiddenLine xmlns:a14="http://schemas.microsoft.com/office/drawing/2010/main" w="9525">
-                <a:solidFill>
-                  <a:schemeClr val="tx1"/>
-                </a:solidFill>
-                <a:miter lim="800000"/>
-                <a:headEnd/>
-                <a:tailEnd/>
-              </a14:hiddenLine>
-            </a:ext>
-            <a:ext uri="{AF507438-7753-43E0-B8FC-AC1667EBCBE1}">
-              <a14:hiddenEffects xmlns:a14="http://schemas.microsoft.com/office/drawing/2010/main">
-                <a:effectLst>
-                  <a:outerShdw dist="35921" dir="2700000" algn="ctr" rotWithShape="0">
-                    <a:schemeClr val="bg2"/>
-                  </a:outerShdw>
-                </a:effectLst>
-              </a14:hiddenEffects>
-            </a:ext>
-          </a:extLst>
-        </p:spPr>
-      </p:pic>
-    </p:spTree>
-    <p:extLst>
-      <p:ext uri="{BB962C8B-B14F-4D97-AF65-F5344CB8AC3E}">
-        <p14:creationId xmlns:p14="http://schemas.microsoft.com/office/powerpoint/2010/main" val="3778905014"/>
-      </p:ext>
-    </p:extLst>
-  </p:cSld>
-  <p:clrMapOvr>
-    <a:masterClrMapping/>
-  </p:clrMapOvr>
-</p:sld>
-</file>
-
-<file path=ppt/slides/slide18.xml><?xml version="1.0" encoding="utf-8"?>
-<p:sld xmlns:a="http://schemas.openxmlformats.org/drawingml/2006/main" xmlns:r="http://schemas.openxmlformats.org/officeDocument/2006/relationships" xmlns:p="http://schemas.openxmlformats.org/presentationml/2006/main">
-  <p:cSld>
-    <p:spTree>
-      <p:nvGrpSpPr>
-        <p:cNvPr id="1" name=""/>
-        <p:cNvGrpSpPr/>
-        <p:nvPr/>
-      </p:nvGrpSpPr>
-      <p:grpSpPr>
-        <a:xfrm>
-          <a:off x="0" y="0"/>
-          <a:ext cx="0" cy="0"/>
-          <a:chOff x="0" y="0"/>
-          <a:chExt cx="0" cy="0"/>
-        </a:xfrm>
-      </p:grpSpPr>
-      <p:sp>
-        <p:nvSpPr>
-          <p:cNvPr id="3" name="Title 2"/>
-          <p:cNvSpPr>
-            <a:spLocks noGrp="1"/>
-          </p:cNvSpPr>
-          <p:nvPr>
-            <p:ph type="title"/>
-          </p:nvPr>
-        </p:nvSpPr>
-        <p:spPr/>
-        <p:txBody>
-          <a:bodyPr/>
-          <a:lstStyle/>
-          <a:p>
-            <a:pPr algn="ctr"/>
-            <a:r>
-              <a:rPr lang="en-GB" dirty="0" smtClean="0"/>
-              <a:t>Phase 2 – Inherited Code</a:t>
-            </a:r>
-            <a:endParaRPr lang="en-GB" dirty="0"/>
-          </a:p>
-        </p:txBody>
-      </p:sp>
-      <p:sp>
-        <p:nvSpPr>
-          <p:cNvPr id="5" name="Text Placeholder 4"/>
-          <p:cNvSpPr>
-            <a:spLocks noGrp="1"/>
-          </p:cNvSpPr>
-          <p:nvPr>
-            <p:ph type="body" idx="1"/>
-          </p:nvPr>
-        </p:nvSpPr>
-        <p:spPr/>
-        <p:txBody>
-          <a:bodyPr/>
-          <a:lstStyle/>
-          <a:p>
-            <a:r>
-              <a:rPr lang="en-GB" dirty="0"/>
-              <a:t>So, how did they </a:t>
-            </a:r>
-            <a:r>
-              <a:rPr lang="en-GB" dirty="0" smtClean="0"/>
-              <a:t>do?</a:t>
-            </a:r>
-            <a:endParaRPr lang="en-GB" dirty="0"/>
-          </a:p>
-        </p:txBody>
-      </p:sp>
-      <p:sp>
-        <p:nvSpPr>
-          <p:cNvPr id="4" name="Slide Number Placeholder 3"/>
-          <p:cNvSpPr>
-            <a:spLocks noGrp="1"/>
-          </p:cNvSpPr>
-          <p:nvPr>
-            <p:ph type="sldNum" sz="quarter" idx="12"/>
-          </p:nvPr>
-        </p:nvSpPr>
-        <p:spPr/>
-        <p:txBody>
-          <a:bodyPr/>
-          <a:lstStyle/>
-          <a:p>
-            <a:fld id="{57E314E1-448B-4E82-884A-39F65482640B}" type="slidenum">
-              <a:rPr lang="en-GB" smtClean="0"/>
-              <a:t>18</a:t>
-            </a:fld>
-            <a:endParaRPr lang="en-GB" dirty="0"/>
-          </a:p>
-        </p:txBody>
-      </p:sp>
-    </p:spTree>
-    <p:extLst>
-      <p:ext uri="{BB962C8B-B14F-4D97-AF65-F5344CB8AC3E}">
-        <p14:creationId xmlns:p14="http://schemas.microsoft.com/office/powerpoint/2010/main" val="279486668"/>
-      </p:ext>
-    </p:extLst>
-  </p:cSld>
-  <p:clrMapOvr>
-    <a:masterClrMapping/>
-  </p:clrMapOvr>
-</p:sld>
-</file>
-
-<file path=ppt/slides/slide19.xml><?xml version="1.0" encoding="utf-8"?>
-<p:sld xmlns:a="http://schemas.openxmlformats.org/drawingml/2006/main" xmlns:r="http://schemas.openxmlformats.org/officeDocument/2006/relationships" xmlns:p="http://schemas.openxmlformats.org/presentationml/2006/main">
-  <p:cSld>
-    <p:spTree>
-      <p:nvGrpSpPr>
-        <p:cNvPr id="1" name=""/>
-        <p:cNvGrpSpPr/>
-        <p:nvPr/>
-      </p:nvGrpSpPr>
-      <p:grpSpPr>
-        <a:xfrm>
-          <a:off x="0" y="0"/>
-          <a:ext cx="0" cy="0"/>
-          <a:chOff x="0" y="0"/>
-          <a:chExt cx="0" cy="0"/>
-        </a:xfrm>
-      </p:grpSpPr>
-      <p:graphicFrame>
-        <p:nvGraphicFramePr>
-          <p:cNvPr id="5" name="Content Placeholder 4"/>
-          <p:cNvGraphicFramePr>
-            <a:graphicFrameLocks noGrp="1"/>
-          </p:cNvGraphicFramePr>
-          <p:nvPr>
-            <p:ph idx="1"/>
-          </p:nvPr>
-        </p:nvGraphicFramePr>
-        <p:xfrm>
-          <a:off x="630872" y="1781016"/>
-          <a:ext cx="7882255" cy="3926205"/>
-        </p:xfrm>
-        <a:graphic>
-          <a:graphicData uri="http://schemas.openxmlformats.org/drawingml/2006/table">
-            <a:tbl>
-              <a:tblPr firstRow="1" firstCol="1" bandRow="1">
-                <a:tableStyleId>{5C22544A-7EE6-4342-B048-85BDC9FD1C3A}</a:tableStyleId>
-              </a:tblPr>
-              <a:tblGrid>
-                <a:gridCol w="2499360"/>
-                <a:gridCol w="1259840"/>
-                <a:gridCol w="4123055"/>
-              </a:tblGrid>
-              <a:tr h="311785">
-                <a:tc>
-                  <a:txBody>
-                    <a:bodyPr/>
-                    <a:lstStyle/>
-                    <a:p>
-                      <a:pPr algn="ctr">
-                        <a:lnSpc>
-                          <a:spcPct val="115000"/>
-                        </a:lnSpc>
-                        <a:spcAft>
-                          <a:spcPts val="0"/>
-                        </a:spcAft>
-                      </a:pPr>
-                      <a:r>
-                        <a:rPr lang="en-GB" sz="1100">
-                          <a:effectLst/>
-                        </a:rPr>
-                        <a:t>What</a:t>
-                      </a:r>
-                      <a:endParaRPr lang="en-GB" sz="1100">
-                        <a:solidFill>
-                          <a:srgbClr val="31849B"/>
-                        </a:solidFill>
-                        <a:effectLst/>
-                        <a:latin typeface="Calibri"/>
-                        <a:ea typeface="Calibri"/>
-                        <a:cs typeface="Times New Roman"/>
-                      </a:endParaRPr>
-                    </a:p>
-                  </a:txBody>
-                  <a:tcPr marL="68580" marR="68580" marT="0" marB="0"/>
-                </a:tc>
-                <a:tc>
-                  <a:txBody>
-                    <a:bodyPr/>
-                    <a:lstStyle/>
-                    <a:p>
-                      <a:pPr algn="ctr">
-                        <a:lnSpc>
-                          <a:spcPct val="115000"/>
-                        </a:lnSpc>
-                        <a:spcAft>
-                          <a:spcPts val="0"/>
-                        </a:spcAft>
-                      </a:pPr>
-                      <a:r>
-                        <a:rPr lang="en-GB" sz="1100">
-                          <a:effectLst/>
-                        </a:rPr>
-                        <a:t>Check</a:t>
-                      </a:r>
-                      <a:endParaRPr lang="en-GB" sz="1100">
-                        <a:solidFill>
-                          <a:srgbClr val="31849B"/>
-                        </a:solidFill>
-                        <a:effectLst/>
-                        <a:latin typeface="Calibri"/>
-                        <a:ea typeface="Calibri"/>
-                        <a:cs typeface="Times New Roman"/>
-                      </a:endParaRPr>
-                    </a:p>
-                  </a:txBody>
-                  <a:tcPr marL="68580" marR="68580" marT="0" marB="0"/>
-                </a:tc>
-                <a:tc>
-                  <a:txBody>
-                    <a:bodyPr/>
-                    <a:lstStyle/>
-                    <a:p>
-                      <a:pPr algn="ctr">
-                        <a:lnSpc>
-                          <a:spcPct val="115000"/>
-                        </a:lnSpc>
-                        <a:spcAft>
-                          <a:spcPts val="0"/>
-                        </a:spcAft>
-                      </a:pPr>
-                      <a:r>
-                        <a:rPr lang="en-GB" sz="1100">
-                          <a:effectLst/>
-                        </a:rPr>
-                        <a:t>Comments</a:t>
-                      </a:r>
-                      <a:endParaRPr lang="en-GB" sz="1100">
-                        <a:solidFill>
-                          <a:srgbClr val="31849B"/>
-                        </a:solidFill>
-                        <a:effectLst/>
-                        <a:latin typeface="Calibri"/>
-                        <a:ea typeface="Calibri"/>
-                        <a:cs typeface="Times New Roman"/>
-                      </a:endParaRPr>
-                    </a:p>
-                  </a:txBody>
-                  <a:tcPr marL="68580" marR="68580" marT="0" marB="0"/>
-                </a:tc>
-              </a:tr>
-              <a:tr h="706120">
-                <a:tc>
-                  <a:txBody>
-                    <a:bodyPr/>
-                    <a:lstStyle/>
-                    <a:p>
-                      <a:pPr marL="342900" lvl="0" indent="-342900">
-                        <a:spcAft>
-                          <a:spcPts val="0"/>
-                        </a:spcAft>
-                        <a:buFont typeface="Wingdings 3"/>
-                        <a:buChar char=""/>
-                        <a:tabLst>
-                          <a:tab pos="457200" algn="l"/>
-                        </a:tabLst>
-                      </a:pPr>
-                      <a:r>
-                        <a:rPr lang="en-GB" sz="1800" kern="1200">
-                          <a:effectLst/>
-                        </a:rPr>
-                        <a:t>Clear report?</a:t>
-                      </a:r>
-                      <a:endParaRPr lang="en-GB" sz="1200">
-                        <a:solidFill>
-                          <a:srgbClr val="31849B"/>
-                        </a:solidFill>
-                        <a:effectLst/>
-                        <a:latin typeface="Times New Roman"/>
-                        <a:ea typeface="Times New Roman"/>
-                      </a:endParaRPr>
-                    </a:p>
-                  </a:txBody>
-                  <a:tcPr marL="68580" marR="68580" marT="0" marB="0"/>
-                </a:tc>
-                <a:tc>
-                  <a:txBody>
-                    <a:bodyPr/>
-                    <a:lstStyle/>
-                    <a:p>
-                      <a:pPr algn="ctr">
-                        <a:lnSpc>
-                          <a:spcPct val="115000"/>
-                        </a:lnSpc>
-                        <a:spcAft>
-                          <a:spcPts val="0"/>
-                        </a:spcAft>
-                      </a:pPr>
-                      <a:endParaRPr lang="en-GB" sz="1100">
-                        <a:solidFill>
-                          <a:srgbClr val="31849B"/>
-                        </a:solidFill>
-                        <a:effectLst/>
-                        <a:latin typeface="Calibri"/>
-                        <a:ea typeface="Calibri"/>
-                        <a:cs typeface="Times New Roman"/>
-                      </a:endParaRPr>
-                    </a:p>
-                  </a:txBody>
-                  <a:tcPr marL="68580" marR="68580" marT="0" marB="0"/>
-                </a:tc>
-                <a:tc>
-                  <a:txBody>
-                    <a:bodyPr/>
-                    <a:lstStyle/>
-                    <a:p>
-                      <a:pPr>
-                        <a:lnSpc>
-                          <a:spcPct val="115000"/>
-                        </a:lnSpc>
-                        <a:spcAft>
-                          <a:spcPts val="0"/>
-                        </a:spcAft>
-                      </a:pPr>
-                      <a:r>
-                        <a:rPr lang="en-GB" sz="1100">
-                          <a:effectLst/>
-                        </a:rPr>
-                        <a:t>Well-explained mathematics and good documentation of results. Authorship clear.</a:t>
-                      </a:r>
-                      <a:endParaRPr lang="en-GB" sz="1100">
-                        <a:solidFill>
-                          <a:srgbClr val="31849B"/>
-                        </a:solidFill>
-                        <a:effectLst/>
-                        <a:latin typeface="Calibri"/>
-                        <a:ea typeface="Calibri"/>
-                        <a:cs typeface="Times New Roman"/>
-                      </a:endParaRPr>
-                    </a:p>
-                  </a:txBody>
-                  <a:tcPr marL="68580" marR="68580" marT="0" marB="0"/>
-                </a:tc>
-              </a:tr>
-              <a:tr h="748030">
-                <a:tc>
-                  <a:txBody>
-                    <a:bodyPr/>
-                    <a:lstStyle/>
-                    <a:p>
-                      <a:pPr marL="342900" lvl="0" indent="-342900">
-                        <a:spcAft>
-                          <a:spcPts val="0"/>
-                        </a:spcAft>
-                        <a:buFont typeface="Wingdings 3"/>
-                        <a:buChar char=""/>
-                        <a:tabLst>
-                          <a:tab pos="457200" algn="l"/>
-                        </a:tabLst>
-                      </a:pPr>
-                      <a:r>
-                        <a:rPr lang="en-GB" sz="1800" kern="1200">
-                          <a:effectLst/>
-                        </a:rPr>
-                        <a:t>User-friendly GUI?</a:t>
-                      </a:r>
-                      <a:endParaRPr lang="en-GB" sz="1200">
-                        <a:solidFill>
-                          <a:srgbClr val="31849B"/>
-                        </a:solidFill>
-                        <a:effectLst/>
-                        <a:latin typeface="Times New Roman"/>
-                        <a:ea typeface="Times New Roman"/>
-                      </a:endParaRPr>
-                    </a:p>
-                  </a:txBody>
-                  <a:tcPr marL="68580" marR="68580" marT="0" marB="0"/>
-                </a:tc>
-                <a:tc>
-                  <a:txBody>
-                    <a:bodyPr/>
-                    <a:lstStyle/>
-                    <a:p>
-                      <a:pPr algn="ctr">
-                        <a:lnSpc>
-                          <a:spcPct val="115000"/>
-                        </a:lnSpc>
-                        <a:spcAft>
-                          <a:spcPts val="0"/>
-                        </a:spcAft>
-                      </a:pPr>
-                      <a:endParaRPr lang="en-GB" sz="1100">
-                        <a:solidFill>
-                          <a:srgbClr val="31849B"/>
-                        </a:solidFill>
-                        <a:effectLst/>
-                        <a:latin typeface="Calibri"/>
-                        <a:ea typeface="Calibri"/>
-                        <a:cs typeface="Times New Roman"/>
-                      </a:endParaRPr>
-                    </a:p>
-                  </a:txBody>
-                  <a:tcPr marL="68580" marR="68580" marT="0" marB="0"/>
-                </a:tc>
-                <a:tc>
-                  <a:txBody>
-                    <a:bodyPr/>
-                    <a:lstStyle/>
-                    <a:p>
-                      <a:pPr>
-                        <a:lnSpc>
-                          <a:spcPct val="115000"/>
-                        </a:lnSpc>
-                        <a:spcAft>
-                          <a:spcPts val="0"/>
-                        </a:spcAft>
-                      </a:pPr>
-                      <a:r>
-                        <a:rPr lang="en-GB" sz="1100">
-                          <a:effectLst/>
-                        </a:rPr>
-                        <a:t>Beautiful GUI. Drop-down menus are a good solution to the multi-parameter problem. Needs a ‘running ’ bar and a reset key.</a:t>
-                      </a:r>
-                      <a:endParaRPr lang="en-GB" sz="1100">
-                        <a:solidFill>
-                          <a:srgbClr val="31849B"/>
-                        </a:solidFill>
-                        <a:effectLst/>
-                        <a:latin typeface="Calibri"/>
-                        <a:ea typeface="Calibri"/>
-                        <a:cs typeface="Times New Roman"/>
-                      </a:endParaRPr>
-                    </a:p>
-                  </a:txBody>
-                  <a:tcPr marL="68580" marR="68580" marT="0" marB="0"/>
-                </a:tc>
-              </a:tr>
-              <a:tr h="706120">
-                <a:tc>
-                  <a:txBody>
-                    <a:bodyPr/>
-                    <a:lstStyle/>
-                    <a:p>
-                      <a:pPr marL="342900" lvl="0" indent="-342900">
-                        <a:spcAft>
-                          <a:spcPts val="0"/>
-                        </a:spcAft>
-                        <a:buFont typeface="Wingdings 3"/>
-                        <a:buChar char=""/>
-                        <a:tabLst>
-                          <a:tab pos="457200" algn="l"/>
-                        </a:tabLst>
-                      </a:pPr>
-                      <a:r>
-                        <a:rPr lang="en-GB" sz="1800" kern="1200">
-                          <a:effectLst/>
-                        </a:rPr>
-                        <a:t>Clear Licencing?</a:t>
-                      </a:r>
-                      <a:endParaRPr lang="en-GB" sz="1200">
-                        <a:solidFill>
-                          <a:srgbClr val="31849B"/>
-                        </a:solidFill>
-                        <a:effectLst/>
-                        <a:latin typeface="Times New Roman"/>
-                        <a:ea typeface="Times New Roman"/>
-                      </a:endParaRPr>
-                    </a:p>
-                  </a:txBody>
-                  <a:tcPr marL="68580" marR="68580" marT="0" marB="0"/>
-                </a:tc>
-                <a:tc>
-                  <a:txBody>
-                    <a:bodyPr/>
-                    <a:lstStyle/>
-                    <a:p>
-                      <a:pPr algn="ctr">
-                        <a:lnSpc>
-                          <a:spcPct val="115000"/>
-                        </a:lnSpc>
-                        <a:spcAft>
-                          <a:spcPts val="0"/>
-                        </a:spcAft>
-                      </a:pPr>
-                      <a:endParaRPr lang="en-GB" sz="1100">
-                        <a:solidFill>
-                          <a:srgbClr val="31849B"/>
-                        </a:solidFill>
-                        <a:effectLst/>
-                        <a:latin typeface="Calibri"/>
-                        <a:ea typeface="Calibri"/>
-                        <a:cs typeface="Times New Roman"/>
-                      </a:endParaRPr>
-                    </a:p>
-                  </a:txBody>
-                  <a:tcPr marL="68580" marR="68580" marT="0" marB="0"/>
-                </a:tc>
-                <a:tc>
-                  <a:txBody>
-                    <a:bodyPr/>
-                    <a:lstStyle/>
-                    <a:p>
-                      <a:pPr>
-                        <a:lnSpc>
-                          <a:spcPct val="115000"/>
-                        </a:lnSpc>
-                        <a:spcAft>
-                          <a:spcPts val="0"/>
-                        </a:spcAft>
-                      </a:pPr>
-                      <a:r>
-                        <a:rPr lang="en-GB" sz="1100">
-                          <a:effectLst/>
-                        </a:rPr>
-                        <a:t>Yes, throughout. Immaculate spelling of CC-BY-3.0. We all felt thoroughly safe.</a:t>
-                      </a:r>
-                      <a:endParaRPr lang="en-GB" sz="1100">
-                        <a:solidFill>
-                          <a:srgbClr val="31849B"/>
-                        </a:solidFill>
-                        <a:effectLst/>
-                        <a:latin typeface="Calibri"/>
-                        <a:ea typeface="Calibri"/>
-                        <a:cs typeface="Times New Roman"/>
-                      </a:endParaRPr>
-                    </a:p>
-                  </a:txBody>
-                  <a:tcPr marL="68580" marR="68580" marT="0" marB="0"/>
-                </a:tc>
-              </a:tr>
-              <a:tr h="748030">
-                <a:tc>
-                  <a:txBody>
-                    <a:bodyPr/>
-                    <a:lstStyle/>
-                    <a:p>
-                      <a:pPr marL="342900" lvl="0" indent="-342900">
-                        <a:spcAft>
-                          <a:spcPts val="0"/>
-                        </a:spcAft>
-                        <a:buFont typeface="Wingdings 3"/>
-                        <a:buChar char=""/>
-                        <a:tabLst>
-                          <a:tab pos="457200" algn="l"/>
-                        </a:tabLst>
-                      </a:pPr>
-                      <a:r>
-                        <a:rPr lang="en-GB" sz="1800" kern="1200">
-                          <a:effectLst/>
-                        </a:rPr>
-                        <a:t>Code Commenting?</a:t>
-                      </a:r>
-                      <a:endParaRPr lang="en-GB" sz="1200">
-                        <a:solidFill>
-                          <a:srgbClr val="31849B"/>
-                        </a:solidFill>
-                        <a:effectLst/>
-                        <a:latin typeface="Times New Roman"/>
-                        <a:ea typeface="Times New Roman"/>
-                      </a:endParaRPr>
-                    </a:p>
-                  </a:txBody>
-                  <a:tcPr marL="68580" marR="68580" marT="0" marB="0"/>
-                </a:tc>
-                <a:tc>
-                  <a:txBody>
-                    <a:bodyPr/>
-                    <a:lstStyle/>
-                    <a:p>
-                      <a:pPr algn="ctr">
-                        <a:lnSpc>
-                          <a:spcPct val="115000"/>
-                        </a:lnSpc>
-                        <a:spcAft>
-                          <a:spcPts val="0"/>
-                        </a:spcAft>
-                      </a:pPr>
-                      <a:endParaRPr lang="en-GB" sz="1100">
-                        <a:solidFill>
-                          <a:srgbClr val="31849B"/>
-                        </a:solidFill>
-                        <a:effectLst/>
-                        <a:latin typeface="Calibri"/>
-                        <a:ea typeface="Calibri"/>
-                        <a:cs typeface="Times New Roman"/>
-                      </a:endParaRPr>
-                    </a:p>
-                  </a:txBody>
-                  <a:tcPr marL="68580" marR="68580" marT="0" marB="0"/>
-                </a:tc>
-                <a:tc>
-                  <a:txBody>
-                    <a:bodyPr/>
-                    <a:lstStyle/>
-                    <a:p>
-                      <a:pPr>
-                        <a:lnSpc>
-                          <a:spcPct val="115000"/>
-                        </a:lnSpc>
-                        <a:spcAft>
-                          <a:spcPts val="0"/>
-                        </a:spcAft>
-                      </a:pPr>
-                      <a:r>
-                        <a:rPr lang="en-GB" sz="1100">
-                          <a:effectLst/>
-                        </a:rPr>
-                        <a:t>Quite thorough.</a:t>
-                      </a:r>
-                      <a:endParaRPr lang="en-GB" sz="1100">
-                        <a:solidFill>
-                          <a:srgbClr val="31849B"/>
-                        </a:solidFill>
-                        <a:effectLst/>
-                        <a:latin typeface="Calibri"/>
-                        <a:ea typeface="Calibri"/>
-                        <a:cs typeface="Times New Roman"/>
-                      </a:endParaRPr>
-                    </a:p>
-                  </a:txBody>
-                  <a:tcPr marL="68580" marR="68580" marT="0" marB="0"/>
-                </a:tc>
-              </a:tr>
-              <a:tr h="706120">
-                <a:tc>
-                  <a:txBody>
-                    <a:bodyPr/>
-                    <a:lstStyle/>
-                    <a:p>
-                      <a:pPr marL="342900" lvl="0" indent="-342900">
-                        <a:spcAft>
-                          <a:spcPts val="0"/>
-                        </a:spcAft>
-                        <a:buFont typeface="Wingdings 3"/>
-                        <a:buChar char=""/>
-                        <a:tabLst>
-                          <a:tab pos="457200" algn="l"/>
-                        </a:tabLst>
-                      </a:pPr>
-                      <a:r>
-                        <a:rPr lang="en-GB" sz="1800" kern="1200">
-                          <a:effectLst/>
-                        </a:rPr>
-                        <a:t>Code Structure?</a:t>
-                      </a:r>
-                      <a:endParaRPr lang="en-GB" sz="1200">
-                        <a:solidFill>
-                          <a:srgbClr val="31849B"/>
-                        </a:solidFill>
-                        <a:effectLst/>
-                        <a:latin typeface="Times New Roman"/>
-                        <a:ea typeface="Times New Roman"/>
-                      </a:endParaRPr>
-                    </a:p>
-                  </a:txBody>
-                  <a:tcPr marL="68580" marR="68580" marT="0" marB="0"/>
-                </a:tc>
-                <a:tc>
-                  <a:txBody>
-                    <a:bodyPr/>
-                    <a:lstStyle/>
-                    <a:p>
-                      <a:pPr algn="ctr">
-                        <a:lnSpc>
-                          <a:spcPct val="115000"/>
-                        </a:lnSpc>
-                        <a:spcAft>
-                          <a:spcPts val="0"/>
-                        </a:spcAft>
-                      </a:pPr>
-                      <a:endParaRPr lang="en-GB" sz="1100">
-                        <a:solidFill>
-                          <a:srgbClr val="31849B"/>
-                        </a:solidFill>
-                        <a:effectLst/>
-                        <a:latin typeface="Calibri"/>
-                        <a:ea typeface="Calibri"/>
-                        <a:cs typeface="Times New Roman"/>
-                      </a:endParaRPr>
-                    </a:p>
-                  </a:txBody>
-                  <a:tcPr marL="68580" marR="68580" marT="0" marB="0"/>
-                </a:tc>
-                <a:tc>
-                  <a:txBody>
-                    <a:bodyPr/>
-                    <a:lstStyle/>
-                    <a:p>
-                      <a:pPr>
-                        <a:lnSpc>
-                          <a:spcPct val="115000"/>
-                        </a:lnSpc>
-                        <a:spcAft>
-                          <a:spcPts val="0"/>
-                        </a:spcAft>
-                      </a:pPr>
-                      <a:r>
-                        <a:rPr lang="en-GB" sz="1100" dirty="0">
-                          <a:effectLst/>
-                        </a:rPr>
-                        <a:t> </a:t>
-                      </a:r>
-                      <a:endParaRPr lang="en-GB" sz="1100" dirty="0">
-                        <a:solidFill>
-                          <a:srgbClr val="31849B"/>
-                        </a:solidFill>
-                        <a:effectLst/>
-                        <a:latin typeface="Calibri"/>
-                        <a:ea typeface="Calibri"/>
-                        <a:cs typeface="Times New Roman"/>
-                      </a:endParaRPr>
-                    </a:p>
-                  </a:txBody>
-                  <a:tcPr marL="68580" marR="68580" marT="0" marB="0"/>
-                </a:tc>
-              </a:tr>
-            </a:tbl>
-          </a:graphicData>
-        </a:graphic>
-      </p:graphicFrame>
-      <p:sp>
-        <p:nvSpPr>
-          <p:cNvPr id="3" name="Title 2"/>
-          <p:cNvSpPr>
-            <a:spLocks noGrp="1"/>
-          </p:cNvSpPr>
-          <p:nvPr>
-            <p:ph type="title"/>
-          </p:nvPr>
-        </p:nvSpPr>
-        <p:spPr/>
-        <p:txBody>
-          <a:bodyPr/>
-          <a:lstStyle/>
-          <a:p>
-            <a:r>
-              <a:rPr lang="en-GB" dirty="0" smtClean="0"/>
-              <a:t>Inherited Material - Checklist</a:t>
-            </a:r>
-            <a:endParaRPr lang="en-GB" dirty="0"/>
-          </a:p>
-        </p:txBody>
-      </p:sp>
-      <p:sp>
-        <p:nvSpPr>
-          <p:cNvPr id="4" name="Slide Number Placeholder 3"/>
-          <p:cNvSpPr>
-            <a:spLocks noGrp="1"/>
-          </p:cNvSpPr>
-          <p:nvPr>
-            <p:ph type="sldNum" sz="quarter" idx="4"/>
-          </p:nvPr>
-        </p:nvSpPr>
-        <p:spPr/>
-        <p:txBody>
-          <a:bodyPr/>
-          <a:lstStyle/>
-          <a:p>
-            <a:fld id="{57E314E1-448B-4E82-884A-39F65482640B}" type="slidenum">
-              <a:rPr lang="en-GB" smtClean="0"/>
-              <a:t>19</a:t>
-            </a:fld>
-            <a:endParaRPr lang="en-GB" dirty="0"/>
-          </a:p>
-        </p:txBody>
-      </p:sp>
-      <p:pic>
-        <p:nvPicPr>
-          <p:cNvPr id="2053" name="Picture 1" descr="http://ts2.mm.bing.net/th?id=H.5024803320954941&amp;pid=1.7&amp;w=199&amp;h=148&amp;c=7&amp;rs=1">
-            <a:hlinkClick r:id="rId2"/>
-          </p:cNvPr>
-          <p:cNvPicPr>
-            <a:picLocks noChangeAspect="1" noChangeArrowheads="1"/>
-          </p:cNvPicPr>
-          <p:nvPr/>
-        </p:nvPicPr>
-        <p:blipFill>
-          <a:blip r:embed="rId3">
-            <a:extLst>
-              <a:ext uri="{28A0092B-C50C-407E-A947-70E740481C1C}">
-                <a14:useLocalDpi xmlns:a14="http://schemas.microsoft.com/office/drawing/2010/main" val="0"/>
-              </a:ext>
-            </a:extLst>
-          </a:blip>
-          <a:srcRect/>
-          <a:stretch>
-            <a:fillRect/>
-          </a:stretch>
-        </p:blipFill>
-        <p:spPr bwMode="auto">
-          <a:xfrm>
-            <a:off x="3347864" y="5013176"/>
-            <a:ext cx="838200" cy="619125"/>
-          </a:xfrm>
-          <a:prstGeom prst="rect">
-            <a:avLst/>
-          </a:prstGeom>
-          <a:noFill/>
-          <a:extLst>
-            <a:ext uri="{909E8E84-426E-40DD-AFC4-6F175D3DCCD1}">
-              <a14:hiddenFill xmlns:a14="http://schemas.microsoft.com/office/drawing/2010/main">
-                <a:solidFill>
-                  <a:srgbClr val="FFFFFF"/>
-                </a:solidFill>
-              </a14:hiddenFill>
-            </a:ext>
-          </a:extLst>
-        </p:spPr>
-      </p:pic>
-      <p:pic>
-        <p:nvPicPr>
-          <p:cNvPr id="2052" name="Picture 2" descr="http://ts2.mm.bing.net/th?id=H.5024803320954941&amp;pid=1.7&amp;w=199&amp;h=148&amp;c=7&amp;rs=1">
-            <a:hlinkClick r:id="rId2"/>
-          </p:cNvPr>
-          <p:cNvPicPr>
-            <a:picLocks noChangeAspect="1" noChangeArrowheads="1"/>
-          </p:cNvPicPr>
-          <p:nvPr/>
-        </p:nvPicPr>
-        <p:blipFill>
-          <a:blip r:embed="rId3">
-            <a:extLst>
-              <a:ext uri="{28A0092B-C50C-407E-A947-70E740481C1C}">
-                <a14:useLocalDpi xmlns:a14="http://schemas.microsoft.com/office/drawing/2010/main" val="0"/>
-              </a:ext>
-            </a:extLst>
-          </a:blip>
-          <a:srcRect/>
-          <a:stretch>
-            <a:fillRect/>
-          </a:stretch>
-        </p:blipFill>
-        <p:spPr bwMode="auto">
-          <a:xfrm>
-            <a:off x="3347864" y="4293096"/>
-            <a:ext cx="838200" cy="619125"/>
-          </a:xfrm>
-          <a:prstGeom prst="rect">
-            <a:avLst/>
-          </a:prstGeom>
-          <a:noFill/>
-          <a:extLst>
-            <a:ext uri="{909E8E84-426E-40DD-AFC4-6F175D3DCCD1}">
-              <a14:hiddenFill xmlns:a14="http://schemas.microsoft.com/office/drawing/2010/main">
-                <a:solidFill>
-                  <a:srgbClr val="FFFFFF"/>
-                </a:solidFill>
-              </a14:hiddenFill>
-            </a:ext>
-          </a:extLst>
-        </p:spPr>
-      </p:pic>
-      <p:pic>
-        <p:nvPicPr>
-          <p:cNvPr id="2051" name="Picture 3" descr="http://ts2.mm.bing.net/th?id=H.5024803320954941&amp;pid=1.7&amp;w=199&amp;h=148&amp;c=7&amp;rs=1">
-            <a:hlinkClick r:id="rId2"/>
-          </p:cNvPr>
-          <p:cNvPicPr>
-            <a:picLocks noChangeAspect="1" noChangeArrowheads="1"/>
-          </p:cNvPicPr>
-          <p:nvPr/>
-        </p:nvPicPr>
-        <p:blipFill>
-          <a:blip r:embed="rId3">
-            <a:extLst>
-              <a:ext uri="{28A0092B-C50C-407E-A947-70E740481C1C}">
-                <a14:useLocalDpi xmlns:a14="http://schemas.microsoft.com/office/drawing/2010/main" val="0"/>
-              </a:ext>
-            </a:extLst>
-          </a:blip>
-          <a:srcRect/>
-          <a:stretch>
-            <a:fillRect/>
-          </a:stretch>
-        </p:blipFill>
-        <p:spPr bwMode="auto">
-          <a:xfrm>
-            <a:off x="3347864" y="3573016"/>
-            <a:ext cx="838200" cy="619125"/>
-          </a:xfrm>
-          <a:prstGeom prst="rect">
-            <a:avLst/>
-          </a:prstGeom>
-          <a:noFill/>
-          <a:extLst>
-            <a:ext uri="{909E8E84-426E-40DD-AFC4-6F175D3DCCD1}">
-              <a14:hiddenFill xmlns:a14="http://schemas.microsoft.com/office/drawing/2010/main">
-                <a:solidFill>
-                  <a:srgbClr val="FFFFFF"/>
-                </a:solidFill>
-              </a14:hiddenFill>
-            </a:ext>
-          </a:extLst>
-        </p:spPr>
-      </p:pic>
-      <p:pic>
-        <p:nvPicPr>
-          <p:cNvPr id="2050" name="Picture 4" descr="http://ts2.mm.bing.net/th?id=H.5024803320954941&amp;pid=1.7&amp;w=199&amp;h=148&amp;c=7&amp;rs=1">
-            <a:hlinkClick r:id="rId2"/>
-          </p:cNvPr>
-          <p:cNvPicPr>
-            <a:picLocks noChangeAspect="1" noChangeArrowheads="1"/>
-          </p:cNvPicPr>
-          <p:nvPr/>
-        </p:nvPicPr>
-        <p:blipFill>
-          <a:blip r:embed="rId3">
-            <a:extLst>
-              <a:ext uri="{28A0092B-C50C-407E-A947-70E740481C1C}">
-                <a14:useLocalDpi xmlns:a14="http://schemas.microsoft.com/office/drawing/2010/main" val="0"/>
-              </a:ext>
-            </a:extLst>
-          </a:blip>
-          <a:srcRect/>
-          <a:stretch>
-            <a:fillRect/>
-          </a:stretch>
-        </p:blipFill>
-        <p:spPr bwMode="auto">
-          <a:xfrm>
-            <a:off x="3329775" y="2852936"/>
-            <a:ext cx="838200" cy="619125"/>
-          </a:xfrm>
-          <a:prstGeom prst="rect">
-            <a:avLst/>
-          </a:prstGeom>
-          <a:noFill/>
-          <a:extLst>
-            <a:ext uri="{909E8E84-426E-40DD-AFC4-6F175D3DCCD1}">
-              <a14:hiddenFill xmlns:a14="http://schemas.microsoft.com/office/drawing/2010/main">
-                <a:solidFill>
-                  <a:srgbClr val="FFFFFF"/>
-                </a:solidFill>
-              </a14:hiddenFill>
-            </a:ext>
-          </a:extLst>
-        </p:spPr>
-      </p:pic>
-      <p:pic>
-        <p:nvPicPr>
-          <p:cNvPr id="2049" name="Picture 5" descr="http://ts2.mm.bing.net/th?id=H.5024803320954941&amp;pid=1.7&amp;w=199&amp;h=148&amp;c=7&amp;rs=1">
-            <a:hlinkClick r:id="rId2"/>
-          </p:cNvPr>
-          <p:cNvPicPr>
-            <a:picLocks noChangeAspect="1" noChangeArrowheads="1"/>
-          </p:cNvPicPr>
-          <p:nvPr/>
-        </p:nvPicPr>
-        <p:blipFill>
-          <a:blip r:embed="rId3">
-            <a:extLst>
-              <a:ext uri="{28A0092B-C50C-407E-A947-70E740481C1C}">
-                <a14:useLocalDpi xmlns:a14="http://schemas.microsoft.com/office/drawing/2010/main" val="0"/>
-              </a:ext>
-            </a:extLst>
-          </a:blip>
-          <a:srcRect/>
-          <a:stretch>
-            <a:fillRect/>
-          </a:stretch>
-        </p:blipFill>
-        <p:spPr bwMode="auto">
-          <a:xfrm>
-            <a:off x="3347864" y="2142281"/>
-            <a:ext cx="838200" cy="619125"/>
-          </a:xfrm>
-          <a:prstGeom prst="rect">
-            <a:avLst/>
-          </a:prstGeom>
-          <a:noFill/>
-          <a:extLst>
-            <a:ext uri="{909E8E84-426E-40DD-AFC4-6F175D3DCCD1}">
-              <a14:hiddenFill xmlns:a14="http://schemas.microsoft.com/office/drawing/2010/main">
-                <a:solidFill>
-                  <a:srgbClr val="FFFFFF"/>
-                </a:solidFill>
-              </a14:hiddenFill>
-            </a:ext>
-          </a:extLst>
-        </p:spPr>
-      </p:pic>
-    </p:spTree>
-    <p:extLst>
-      <p:ext uri="{BB962C8B-B14F-4D97-AF65-F5344CB8AC3E}">
-        <p14:creationId xmlns:p14="http://schemas.microsoft.com/office/powerpoint/2010/main" val="4177675242"/>
-      </p:ext>
-    </p:extLst>
-  </p:cSld>
-  <p:clrMapOvr>
-    <a:masterClrMapping/>
-  </p:clrMapOvr>
-</p:sld>
-</file>
-
 <file path=ppt/slides/slide2.xml><?xml version="1.0" encoding="utf-8"?>
 <p:sld xmlns:a="http://schemas.openxmlformats.org/drawingml/2006/main" xmlns:r="http://schemas.openxmlformats.org/officeDocument/2006/relationships" xmlns:p="http://schemas.openxmlformats.org/presentationml/2006/main">
   <p:cSld>
@@ -9348,141 +7763,6 @@
       </p:par>
     </p:tnLst>
   </p:timing>
-</p:sld>
-</file>
-
-<file path=ppt/slides/slide20.xml><?xml version="1.0" encoding="utf-8"?>
-<p:sld xmlns:a="http://schemas.openxmlformats.org/drawingml/2006/main" xmlns:r="http://schemas.openxmlformats.org/officeDocument/2006/relationships" xmlns:p="http://schemas.openxmlformats.org/presentationml/2006/main">
-  <p:cSld>
-    <p:spTree>
-      <p:nvGrpSpPr>
-        <p:cNvPr id="1" name=""/>
-        <p:cNvGrpSpPr/>
-        <p:nvPr/>
-      </p:nvGrpSpPr>
-      <p:grpSpPr>
-        <a:xfrm>
-          <a:off x="0" y="0"/>
-          <a:ext cx="0" cy="0"/>
-          <a:chOff x="0" y="0"/>
-          <a:chExt cx="0" cy="0"/>
-        </a:xfrm>
-      </p:grpSpPr>
-      <p:sp>
-        <p:nvSpPr>
-          <p:cNvPr id="2" name="Content Placeholder 1"/>
-          <p:cNvSpPr>
-            <a:spLocks noGrp="1"/>
-          </p:cNvSpPr>
-          <p:nvPr>
-            <p:ph idx="1"/>
-          </p:nvPr>
-        </p:nvSpPr>
-        <p:spPr/>
-        <p:txBody>
-          <a:bodyPr/>
-          <a:lstStyle/>
-          <a:p>
-            <a:r>
-              <a:rPr lang="en-GB" dirty="0" smtClean="0"/>
-              <a:t>A number of papers have discussed the inclusion of drug variables in human virus response </a:t>
-            </a:r>
-            <a:r>
-              <a:rPr lang="en-GB" sz="1400" dirty="0" smtClean="0"/>
-              <a:t>(e.g. Smith and </a:t>
-            </a:r>
-            <a:r>
-              <a:rPr lang="en-GB" sz="1400" dirty="0" err="1" smtClean="0"/>
-              <a:t>Perelson</a:t>
-            </a:r>
-            <a:r>
-              <a:rPr lang="en-GB" sz="1400" dirty="0" smtClean="0"/>
-              <a:t> 2011…)</a:t>
-            </a:r>
-          </a:p>
-          <a:p>
-            <a:endParaRPr lang="en-GB" dirty="0" smtClean="0"/>
-          </a:p>
-          <a:p>
-            <a:r>
-              <a:rPr lang="en-GB" dirty="0" smtClean="0"/>
-              <a:t>Approach 1: 2-compartment pharmacokinetic model (adds extra ODEs to describe )</a:t>
-            </a:r>
-          </a:p>
-          <a:p>
-            <a:endParaRPr lang="en-GB" dirty="0" smtClean="0"/>
-          </a:p>
-          <a:p>
-            <a:r>
-              <a:rPr lang="en-GB" dirty="0" smtClean="0"/>
-              <a:t>Approach 2: Analytical expression for drug effects</a:t>
-            </a:r>
-            <a:endParaRPr lang="en-GB" dirty="0"/>
-          </a:p>
-        </p:txBody>
-      </p:sp>
-      <p:sp>
-        <p:nvSpPr>
-          <p:cNvPr id="3" name="Title 2"/>
-          <p:cNvSpPr>
-            <a:spLocks noGrp="1"/>
-          </p:cNvSpPr>
-          <p:nvPr>
-            <p:ph type="title"/>
-          </p:nvPr>
-        </p:nvSpPr>
-        <p:spPr/>
-        <p:txBody>
-          <a:bodyPr>
-            <a:normAutofit fontScale="90000"/>
-          </a:bodyPr>
-          <a:lstStyle/>
-          <a:p>
-            <a:r>
-              <a:rPr lang="en-GB" dirty="0" smtClean="0"/>
-              <a:t>Extensions 2:</a:t>
-            </a:r>
-            <a:r>
-              <a:rPr lang="en-GB" sz="3100" dirty="0" smtClean="0"/>
-              <a:t> Influence of antiviral drugs</a:t>
-            </a:r>
-            <a:endParaRPr lang="en-GB" sz="3100" dirty="0"/>
-          </a:p>
-        </p:txBody>
-      </p:sp>
-      <p:sp>
-        <p:nvSpPr>
-          <p:cNvPr id="4" name="Slide Number Placeholder 3"/>
-          <p:cNvSpPr>
-            <a:spLocks noGrp="1"/>
-          </p:cNvSpPr>
-          <p:nvPr>
-            <p:ph type="sldNum" sz="quarter" idx="4"/>
-          </p:nvPr>
-        </p:nvSpPr>
-        <p:spPr/>
-        <p:txBody>
-          <a:bodyPr/>
-          <a:lstStyle/>
-          <a:p>
-            <a:fld id="{57E314E1-448B-4E82-884A-39F65482640B}" type="slidenum">
-              <a:rPr lang="en-GB" smtClean="0"/>
-              <a:t>20</a:t>
-            </a:fld>
-            <a:endParaRPr lang="en-GB" dirty="0"/>
-          </a:p>
-        </p:txBody>
-      </p:sp>
-    </p:spTree>
-    <p:extLst>
-      <p:ext uri="{BB962C8B-B14F-4D97-AF65-F5344CB8AC3E}">
-        <p14:creationId xmlns:p14="http://schemas.microsoft.com/office/powerpoint/2010/main" val="174152447"/>
-      </p:ext>
-    </p:extLst>
-  </p:cSld>
-  <p:clrMapOvr>
-    <a:masterClrMapping/>
-  </p:clrMapOvr>
 </p:sld>
 </file>
 

</xml_diff>

<commit_message>
added a critique point for Johnston et al in pres
</commit_message>
<xml_diff>
--- a/PresentationPhase1.pptx
+++ b/PresentationPhase1.pptx
@@ -205,7 +205,7 @@
           <a:p>
             <a:fld id="{B2014153-674E-42F2-B926-FA649665C89E}" type="datetimeFigureOut">
               <a:rPr lang="en-GB" smtClean="0"/>
-              <a:t>17/01/2013</a:t>
+              <a:t>18/01/2013</a:t>
             </a:fld>
             <a:endParaRPr lang="en-GB"/>
           </a:p>
@@ -1098,7 +1098,7 @@
           <a:p>
             <a:fld id="{CCAC0F4C-7C50-4D03-9158-986245769662}" type="datetime1">
               <a:rPr lang="en-GB" smtClean="0"/>
-              <a:t>17/01/2013</a:t>
+              <a:t>18/01/2013</a:t>
             </a:fld>
             <a:endParaRPr lang="en-GB"/>
           </a:p>
@@ -1294,7 +1294,7 @@
           <a:p>
             <a:fld id="{AF7499EF-0FF6-4B85-B04C-CAD010C097E3}" type="datetime1">
               <a:rPr lang="en-GB" smtClean="0"/>
-              <a:t>17/01/2013</a:t>
+              <a:t>18/01/2013</a:t>
             </a:fld>
             <a:endParaRPr lang="en-GB"/>
           </a:p>
@@ -1479,7 +1479,7 @@
           <a:p>
             <a:fld id="{E378A640-8591-4EBC-9E03-0887BA622806}" type="datetime1">
               <a:rPr lang="en-GB" smtClean="0"/>
-              <a:t>17/01/2013</a:t>
+              <a:t>18/01/2013</a:t>
             </a:fld>
             <a:endParaRPr lang="en-GB"/>
           </a:p>
@@ -1629,7 +1629,7 @@
           <a:p>
             <a:fld id="{6AABCCC4-AA31-4FAD-9A2F-FC5969CF6647}" type="datetime1">
               <a:rPr lang="en-GB" smtClean="0"/>
-              <a:t>17/01/2013</a:t>
+              <a:t>18/01/2013</a:t>
             </a:fld>
             <a:endParaRPr lang="en-GB" dirty="0"/>
           </a:p>
@@ -1903,7 +1903,7 @@
           <a:p>
             <a:fld id="{C6F94103-F12E-4F79-86A8-B2DA3F3AE14B}" type="datetime1">
               <a:rPr lang="en-GB" smtClean="0"/>
-              <a:t>17/01/2013</a:t>
+              <a:t>18/01/2013</a:t>
             </a:fld>
             <a:endParaRPr lang="en-GB"/>
           </a:p>
@@ -2312,7 +2312,7 @@
           <a:p>
             <a:fld id="{4CB16F40-84FB-427F-884A-CB32C26D5BCB}" type="datetime1">
               <a:rPr lang="en-GB" smtClean="0"/>
-              <a:t>17/01/2013</a:t>
+              <a:t>18/01/2013</a:t>
             </a:fld>
             <a:endParaRPr lang="en-GB"/>
           </a:p>
@@ -2758,7 +2758,7 @@
           <a:p>
             <a:fld id="{78872670-692A-4F41-83D8-513327A731FF}" type="datetime1">
               <a:rPr lang="en-GB" smtClean="0"/>
-              <a:t>17/01/2013</a:t>
+              <a:t>18/01/2013</a:t>
             </a:fld>
             <a:endParaRPr lang="en-GB"/>
           </a:p>
@@ -2859,7 +2859,7 @@
           <a:p>
             <a:fld id="{DCEBD64C-72C5-4F73-A0E3-69EAE10396D1}" type="datetime1">
               <a:rPr lang="en-GB" smtClean="0"/>
-              <a:t>17/01/2013</a:t>
+              <a:t>18/01/2013</a:t>
             </a:fld>
             <a:endParaRPr lang="en-GB"/>
           </a:p>
@@ -2980,7 +2980,7 @@
           <a:p>
             <a:fld id="{F70B75FB-66F6-49D1-8465-53801BDB8A25}" type="datetime1">
               <a:rPr lang="en-GB" smtClean="0"/>
-              <a:t>17/01/2013</a:t>
+              <a:t>18/01/2013</a:t>
             </a:fld>
             <a:endParaRPr lang="en-GB"/>
           </a:p>
@@ -3254,7 +3254,7 @@
           <a:p>
             <a:fld id="{CC74C73F-25A1-4849-BD30-0546CCB66BDD}" type="datetime1">
               <a:rPr lang="en-GB" smtClean="0"/>
-              <a:t>17/01/2013</a:t>
+              <a:t>18/01/2013</a:t>
             </a:fld>
             <a:endParaRPr lang="en-GB"/>
           </a:p>
@@ -3459,7 +3459,7 @@
           <a:p>
             <a:fld id="{2F27B4C5-62D5-4A1B-A4B5-C8C14E1AE00B}" type="datetime1">
               <a:rPr lang="en-GB" smtClean="0"/>
-              <a:t>17/01/2013</a:t>
+              <a:t>18/01/2013</a:t>
             </a:fld>
             <a:endParaRPr lang="en-GB"/>
           </a:p>
@@ -4568,7 +4568,7 @@
           <a:p>
             <a:fld id="{4391FB4E-AC24-4A5A-94A9-F5D180CA7182}" type="datetime1">
               <a:rPr lang="en-GB" smtClean="0"/>
-              <a:t>17/01/2013</a:t>
+              <a:t>18/01/2013</a:t>
             </a:fld>
             <a:endParaRPr lang="en-GB"/>
           </a:p>
@@ -6789,11 +6789,7 @@
           <a:p>
             <a:r>
               <a:rPr lang="en-GB" dirty="0" smtClean="0"/>
-              <a:t>We tried 2 methods</a:t>
-            </a:r>
-            <a:r>
-              <a:rPr lang="en-GB" dirty="0" smtClean="0"/>
-              <a:t>:</a:t>
+              <a:t>We tried 2 methods:</a:t>
             </a:r>
           </a:p>
           <a:p>
@@ -6807,11 +6803,7 @@
             <a:pPr lvl="1"/>
             <a:r>
               <a:rPr lang="en-GB" dirty="0" smtClean="0"/>
-              <a:t>simulation end </a:t>
-            </a:r>
-            <a:r>
-              <a:rPr lang="en-GB" dirty="0" smtClean="0"/>
-              <a:t>&lt; 0.01</a:t>
+              <a:t>simulation end &lt; 0.01</a:t>
             </a:r>
           </a:p>
           <a:p>
@@ -6833,7 +6825,6 @@
               <a:rPr lang="en-GB" dirty="0" smtClean="0"/>
               <a:t>the end of the simulation </a:t>
             </a:r>
-            <a:endParaRPr lang="en-GB" dirty="0" smtClean="0"/>
           </a:p>
         </p:txBody>
       </p:sp>
@@ -7089,11 +7080,7 @@
           <a:p>
             <a:r>
               <a:rPr lang="en-GB" dirty="0" smtClean="0"/>
-              <a:t>We tried 2 methods</a:t>
-            </a:r>
-            <a:r>
-              <a:rPr lang="en-GB" dirty="0" smtClean="0"/>
-              <a:t>:</a:t>
+              <a:t>We tried 2 methods:</a:t>
             </a:r>
           </a:p>
           <a:p>
@@ -7107,11 +7094,7 @@
             <a:pPr lvl="1"/>
             <a:r>
               <a:rPr lang="en-GB" dirty="0" smtClean="0"/>
-              <a:t>simulation end </a:t>
-            </a:r>
-            <a:r>
-              <a:rPr lang="en-GB" dirty="0" smtClean="0"/>
-              <a:t>&lt; 0.01</a:t>
+              <a:t>simulation end &lt; 0.01</a:t>
             </a:r>
           </a:p>
           <a:p>
@@ -7133,7 +7116,6 @@
               <a:rPr lang="en-GB" dirty="0" smtClean="0"/>
               <a:t>the end of the simulation </a:t>
             </a:r>
-            <a:endParaRPr lang="en-GB" dirty="0" smtClean="0"/>
           </a:p>
         </p:txBody>
       </p:sp>
@@ -7877,15 +7859,7 @@
             </a:pPr>
             <a:r>
               <a:rPr lang="en-GB" sz="1600" dirty="0" smtClean="0"/>
-              <a:t>Implemented </a:t>
-            </a:r>
-            <a:r>
-              <a:rPr lang="en-GB" sz="1600" smtClean="0"/>
-              <a:t>and compared stability </a:t>
-            </a:r>
-            <a:r>
-              <a:rPr lang="en-GB" sz="1600" dirty="0" smtClean="0"/>
-              <a:t>analysers</a:t>
+              <a:t>Implemented and compared stability analysers</a:t>
             </a:r>
           </a:p>
           <a:p>
@@ -7919,8 +7893,53 @@
             </a:pPr>
             <a:r>
               <a:rPr lang="en-GB" sz="1600" dirty="0" smtClean="0"/>
-              <a:t>Used GUI to corroborate analytical stability plots!</a:t>
-            </a:r>
+              <a:t>Used GUI to corroborate analytical stability plots</a:t>
+            </a:r>
+            <a:r>
+              <a:rPr lang="en-GB" sz="1600" dirty="0" smtClean="0"/>
+              <a:t>!</a:t>
+            </a:r>
+          </a:p>
+          <a:p>
+            <a:pPr>
+              <a:buFont typeface="Courier New" pitchFamily="49" charset="0"/>
+              <a:buChar char="o"/>
+            </a:pPr>
+            <a:endParaRPr lang="en-GB" sz="1600" dirty="0" smtClean="0"/>
+          </a:p>
+          <a:p>
+            <a:pPr>
+              <a:buFont typeface="Courier New" pitchFamily="49" charset="0"/>
+              <a:buChar char="o"/>
+            </a:pPr>
+            <a:endParaRPr lang="en-GB" sz="1600" dirty="0"/>
+          </a:p>
+          <a:p>
+            <a:pPr>
+              <a:buFont typeface="Courier New" pitchFamily="49" charset="0"/>
+              <a:buChar char="o"/>
+            </a:pPr>
+            <a:r>
+              <a:rPr lang="en-GB" sz="1600" dirty="0" smtClean="0"/>
+              <a:t>Johnston et al. omitted information on possible scaling of </a:t>
+            </a:r>
+            <a:r>
+              <a:rPr lang="el-GR" sz="1600" dirty="0" smtClean="0"/>
+              <a:t>α</a:t>
+            </a:r>
+            <a:r>
+              <a:rPr lang="en-GB" sz="1600" dirty="0" smtClean="0"/>
+              <a:t> and </a:t>
+            </a:r>
+            <a:r>
+              <a:rPr lang="el-GR" sz="1600" dirty="0" smtClean="0"/>
+              <a:t>β</a:t>
+            </a:r>
+            <a:r>
+              <a:rPr lang="en-GB" sz="1600" dirty="0" smtClean="0"/>
+              <a:t> values complicating reproducibility</a:t>
+            </a:r>
+            <a:endParaRPr lang="en-GB" sz="1600" dirty="0" smtClean="0"/>
           </a:p>
           <a:p>
             <a:pPr>
@@ -8163,6 +8182,58 @@
           </a:extLst>
         </p:spPr>
       </p:pic>
+      <p:sp>
+        <p:nvSpPr>
+          <p:cNvPr id="9" name="Smiley Face 8"/>
+          <p:cNvSpPr/>
+          <p:nvPr/>
+        </p:nvSpPr>
+        <p:spPr>
+          <a:xfrm>
+            <a:off x="6414079" y="4725143"/>
+            <a:ext cx="678201" cy="648073"/>
+          </a:xfrm>
+          <a:prstGeom prst="smileyFace">
+            <a:avLst>
+              <a:gd name="adj" fmla="val -4653"/>
+            </a:avLst>
+          </a:prstGeom>
+          <a:solidFill>
+            <a:schemeClr val="bg2">
+              <a:lumMod val="90000"/>
+            </a:schemeClr>
+          </a:solidFill>
+          <a:ln>
+            <a:solidFill>
+              <a:schemeClr val="tx1"/>
+            </a:solidFill>
+          </a:ln>
+        </p:spPr>
+        <p:style>
+          <a:lnRef idx="2">
+            <a:schemeClr val="accent1">
+              <a:shade val="50000"/>
+            </a:schemeClr>
+          </a:lnRef>
+          <a:fillRef idx="1">
+            <a:schemeClr val="accent1"/>
+          </a:fillRef>
+          <a:effectRef idx="0">
+            <a:schemeClr val="accent1"/>
+          </a:effectRef>
+          <a:fontRef idx="minor">
+            <a:schemeClr val="lt1"/>
+          </a:fontRef>
+        </p:style>
+        <p:txBody>
+          <a:bodyPr rtlCol="0" anchor="ctr"/>
+          <a:lstStyle/>
+          <a:p>
+            <a:pPr algn="ctr"/>
+            <a:endParaRPr lang="en-GB"/>
+          </a:p>
+        </p:txBody>
+      </p:sp>
     </p:spTree>
     <p:extLst>
       <p:ext uri="{BB962C8B-B14F-4D97-AF65-F5344CB8AC3E}">

</xml_diff>